<commit_message>
update figure 4 to have differences in absolute values
</commit_message>
<xml_diff>
--- a/outputs/04_outputs_figures/figure4-raw.pptx
+++ b/outputs/04_outputs_figures/figure4-raw.pptx
@@ -9,7 +9,7 @@
     <p:sldId id="257" r:id="rId3"/>
     <p:sldId id="258" r:id="rId4"/>
     <p:sldId id="259" r:id="rId5"/>
-    <p:sldId id="261" r:id="rId6"/>
+    <p:sldId id="262" r:id="rId6"/>
   </p:sldIdLst>
   <p:sldSz cx="10698163" cy="7562850"/>
   <p:notesSz cx="6858000" cy="9144000"/>
@@ -308,7 +308,7 @@
           <a:p>
             <a:fld id="{6BA5D40C-A8DC-479A-A5D3-E7B4936A184B}" type="datetimeFigureOut">
               <a:rPr lang="en-GB" smtClean="0"/>
-              <a:t>05/05/2023</a:t>
+              <a:t>09/05/2023</a:t>
             </a:fld>
             <a:endParaRPr lang="en-GB"/>
           </a:p>
@@ -478,7 +478,7 @@
           <a:p>
             <a:fld id="{6BA5D40C-A8DC-479A-A5D3-E7B4936A184B}" type="datetimeFigureOut">
               <a:rPr lang="en-GB" smtClean="0"/>
-              <a:t>05/05/2023</a:t>
+              <a:t>09/05/2023</a:t>
             </a:fld>
             <a:endParaRPr lang="en-GB"/>
           </a:p>
@@ -658,7 +658,7 @@
           <a:p>
             <a:fld id="{6BA5D40C-A8DC-479A-A5D3-E7B4936A184B}" type="datetimeFigureOut">
               <a:rPr lang="en-GB" smtClean="0"/>
-              <a:t>05/05/2023</a:t>
+              <a:t>09/05/2023</a:t>
             </a:fld>
             <a:endParaRPr lang="en-GB"/>
           </a:p>
@@ -828,7 +828,7 @@
           <a:p>
             <a:fld id="{6BA5D40C-A8DC-479A-A5D3-E7B4936A184B}" type="datetimeFigureOut">
               <a:rPr lang="en-GB" smtClean="0"/>
-              <a:t>05/05/2023</a:t>
+              <a:t>09/05/2023</a:t>
             </a:fld>
             <a:endParaRPr lang="en-GB"/>
           </a:p>
@@ -1074,7 +1074,7 @@
           <a:p>
             <a:fld id="{6BA5D40C-A8DC-479A-A5D3-E7B4936A184B}" type="datetimeFigureOut">
               <a:rPr lang="en-GB" smtClean="0"/>
-              <a:t>05/05/2023</a:t>
+              <a:t>09/05/2023</a:t>
             </a:fld>
             <a:endParaRPr lang="en-GB"/>
           </a:p>
@@ -1362,7 +1362,7 @@
           <a:p>
             <a:fld id="{6BA5D40C-A8DC-479A-A5D3-E7B4936A184B}" type="datetimeFigureOut">
               <a:rPr lang="en-GB" smtClean="0"/>
-              <a:t>05/05/2023</a:t>
+              <a:t>09/05/2023</a:t>
             </a:fld>
             <a:endParaRPr lang="en-GB"/>
           </a:p>
@@ -1789,7 +1789,7 @@
           <a:p>
             <a:fld id="{6BA5D40C-A8DC-479A-A5D3-E7B4936A184B}" type="datetimeFigureOut">
               <a:rPr lang="en-GB" smtClean="0"/>
-              <a:t>05/05/2023</a:t>
+              <a:t>09/05/2023</a:t>
             </a:fld>
             <a:endParaRPr lang="en-GB"/>
           </a:p>
@@ -1907,7 +1907,7 @@
           <a:p>
             <a:fld id="{6BA5D40C-A8DC-479A-A5D3-E7B4936A184B}" type="datetimeFigureOut">
               <a:rPr lang="en-GB" smtClean="0"/>
-              <a:t>05/05/2023</a:t>
+              <a:t>09/05/2023</a:t>
             </a:fld>
             <a:endParaRPr lang="en-GB"/>
           </a:p>
@@ -2002,7 +2002,7 @@
           <a:p>
             <a:fld id="{6BA5D40C-A8DC-479A-A5D3-E7B4936A184B}" type="datetimeFigureOut">
               <a:rPr lang="en-GB" smtClean="0"/>
-              <a:t>05/05/2023</a:t>
+              <a:t>09/05/2023</a:t>
             </a:fld>
             <a:endParaRPr lang="en-GB"/>
           </a:p>
@@ -2279,7 +2279,7 @@
           <a:p>
             <a:fld id="{6BA5D40C-A8DC-479A-A5D3-E7B4936A184B}" type="datetimeFigureOut">
               <a:rPr lang="en-GB" smtClean="0"/>
-              <a:t>05/05/2023</a:t>
+              <a:t>09/05/2023</a:t>
             </a:fld>
             <a:endParaRPr lang="en-GB"/>
           </a:p>
@@ -2532,7 +2532,7 @@
           <a:p>
             <a:fld id="{6BA5D40C-A8DC-479A-A5D3-E7B4936A184B}" type="datetimeFigureOut">
               <a:rPr lang="en-GB" smtClean="0"/>
-              <a:t>05/05/2023</a:t>
+              <a:t>09/05/2023</a:t>
             </a:fld>
             <a:endParaRPr lang="en-GB"/>
           </a:p>
@@ -2745,7 +2745,7 @@
           <a:p>
             <a:fld id="{6BA5D40C-A8DC-479A-A5D3-E7B4936A184B}" type="datetimeFigureOut">
               <a:rPr lang="en-GB" smtClean="0"/>
-              <a:t>05/05/2023</a:t>
+              <a:t>09/05/2023</a:t>
             </a:fld>
             <a:endParaRPr lang="en-GB"/>
           </a:p>
@@ -11047,10 +11047,10 @@
       </p:grpSpPr>
       <p:grpSp>
         <p:nvGrpSpPr>
-          <p:cNvPr id="433" name="Groupe 432">
+          <p:cNvPr id="6" name="Groupe 5">
             <a:extLst>
               <a:ext uri="{FF2B5EF4-FFF2-40B4-BE49-F238E27FC236}">
-                <a16:creationId xmlns:a16="http://schemas.microsoft.com/office/drawing/2014/main" id="{D91C6FAE-B17E-4FFA-A817-B522ACFB2261}"/>
+                <a16:creationId xmlns:a16="http://schemas.microsoft.com/office/drawing/2014/main" id="{5AB9FF24-7EA3-1DDA-F494-50CF91C7D8E6}"/>
               </a:ext>
             </a:extLst>
           </p:cNvPr>
@@ -11060,9 +11060,9 @@
         <p:grpSpPr>
           <a:xfrm>
             <a:off x="0" y="326456"/>
-            <a:ext cx="10698163" cy="7578756"/>
+            <a:ext cx="10698163" cy="7569769"/>
             <a:chOff x="0" y="326456"/>
-            <a:chExt cx="10698163" cy="7578756"/>
+            <a:chExt cx="10698163" cy="7569769"/>
           </a:xfrm>
         </p:grpSpPr>
         <p:grpSp>
@@ -12883,36 +12883,6 @@
         </p:sp>
         <p:pic>
           <p:nvPicPr>
-            <p:cNvPr id="3" name="Image 2" descr="Une image contenant graphique">
-              <a:extLst>
-                <a:ext uri="{FF2B5EF4-FFF2-40B4-BE49-F238E27FC236}">
-                  <a16:creationId xmlns:a16="http://schemas.microsoft.com/office/drawing/2014/main" id="{377C0133-D7EC-4ABC-921D-4C9D668DE31B}"/>
-                </a:ext>
-              </a:extLst>
-            </p:cNvPr>
-            <p:cNvPicPr>
-              <a:picLocks noChangeAspect="1"/>
-            </p:cNvPicPr>
-            <p:nvPr/>
-          </p:nvPicPr>
-          <p:blipFill>
-            <a:blip r:embed="rId2"/>
-            <a:stretch>
-              <a:fillRect/>
-            </a:stretch>
-          </p:blipFill>
-          <p:spPr>
-            <a:xfrm>
-              <a:off x="0" y="4848225"/>
-              <a:ext cx="10698163" cy="3056987"/>
-            </a:xfrm>
-            <a:prstGeom prst="rect">
-              <a:avLst/>
-            </a:prstGeom>
-          </p:spPr>
-        </p:pic>
-        <p:pic>
-          <p:nvPicPr>
             <p:cNvPr id="169" name="Image 168">
               <a:extLst>
                 <a:ext uri="{FF2B5EF4-FFF2-40B4-BE49-F238E27FC236}">
@@ -12926,7 +12896,7 @@
             <p:nvPr/>
           </p:nvPicPr>
           <p:blipFill>
-            <a:blip r:embed="rId3"/>
+            <a:blip r:embed="rId2"/>
             <a:stretch>
               <a:fillRect/>
             </a:stretch>
@@ -12956,6 +12926,36 @@
             <p:nvPr/>
           </p:nvPicPr>
           <p:blipFill>
+            <a:blip r:embed="rId3"/>
+            <a:stretch>
+              <a:fillRect/>
+            </a:stretch>
+          </p:blipFill>
+          <p:spPr>
+            <a:xfrm>
+              <a:off x="642501" y="509551"/>
+              <a:ext cx="4630380" cy="3589377"/>
+            </a:xfrm>
+            <a:prstGeom prst="rect">
+              <a:avLst/>
+            </a:prstGeom>
+          </p:spPr>
+        </p:pic>
+        <p:pic>
+          <p:nvPicPr>
+            <p:cNvPr id="5" name="Image 4" descr="Une image contenant graphique&#10;&#10;Description générée automatiquement">
+              <a:extLst>
+                <a:ext uri="{FF2B5EF4-FFF2-40B4-BE49-F238E27FC236}">
+                  <a16:creationId xmlns:a16="http://schemas.microsoft.com/office/drawing/2014/main" id="{173D04B8-E7BA-A75E-B393-88946EBF0862}"/>
+                </a:ext>
+              </a:extLst>
+            </p:cNvPr>
+            <p:cNvPicPr>
+              <a:picLocks noChangeAspect="1"/>
+            </p:cNvPicPr>
+            <p:nvPr/>
+          </p:nvPicPr>
+          <p:blipFill>
             <a:blip r:embed="rId4"/>
             <a:stretch>
               <a:fillRect/>
@@ -12963,8 +12963,8 @@
           </p:blipFill>
           <p:spPr>
             <a:xfrm>
-              <a:off x="642501" y="509551"/>
-              <a:ext cx="4630380" cy="3589377"/>
+              <a:off x="0" y="4839238"/>
+              <a:ext cx="10698163" cy="3056987"/>
             </a:xfrm>
             <a:prstGeom prst="rect">
               <a:avLst/>
@@ -12975,7 +12975,7 @@
     </p:spTree>
     <p:extLst>
       <p:ext uri="{BB962C8B-B14F-4D97-AF65-F5344CB8AC3E}">
-        <p14:creationId xmlns:p14="http://schemas.microsoft.com/office/powerpoint/2010/main" val="3551211903"/>
+        <p14:creationId xmlns:p14="http://schemas.microsoft.com/office/powerpoint/2010/main" val="2351815363"/>
       </p:ext>
     </p:extLst>
   </p:cSld>

</xml_diff>